<commit_message>
Writing subsection on simulated samples (and adding appropriate references). Beginning to rewrite JEC section. Improving vocabulary. Redesigning the key in my L1T data flow figure
</commit_message>
<xml_diff>
--- a/chapters/detector/figures/CMS_L1T_data_flow.pptx
+++ b/chapters/detector/figures/CMS_L1T_data_flow.pptx
@@ -9,8 +9,8 @@
   </p:notesMasterIdLst>
   <p:sldIdLst>
     <p:sldId id="256" r:id="rId2"/>
-    <p:sldId id="257" r:id="rId3"/>
-    <p:sldId id="260" r:id="rId4"/>
+    <p:sldId id="261" r:id="rId3"/>
+    <p:sldId id="263" r:id="rId4"/>
   </p:sldIdLst>
   <p:sldSz cx="9144000" cy="6858000" type="screen4x3"/>
   <p:notesSz cx="6858000" cy="9144000"/>
@@ -199,7 +199,7 @@
           <a:p>
             <a:fld id="{C6BCDC76-EC6C-0A41-B02C-2AFA1CDB0147}" type="datetimeFigureOut">
               <a:rPr lang="en-US" smtClean="0"/>
-              <a:t>4/2/20</a:t>
+              <a:t>4/3/20</a:t>
             </a:fld>
             <a:endParaRPr lang="en-US"/>
           </a:p>
@@ -600,7 +600,15 @@
           <a:p>
             <a:r>
               <a:rPr lang="en-US" dirty="0"/>
-              <a:t>Adding a key (order is roughly top-to-bottom)</a:t>
+              <a:t>Adding a key (</a:t>
+            </a:r>
+            <a:r>
+              <a:rPr lang="en-US" dirty="0" err="1"/>
+              <a:t>Calo</a:t>
+            </a:r>
+            <a:r>
+              <a:rPr lang="en-US" dirty="0"/>
+              <a:t> on the left, Muon on the right, order left-to-right, top-to-bottom)</a:t>
             </a:r>
           </a:p>
         </p:txBody>
@@ -631,7 +639,7 @@
     </p:spTree>
     <p:extLst>
       <p:ext uri="{BB962C8B-B14F-4D97-AF65-F5344CB8AC3E}">
-        <p14:creationId xmlns:p14="http://schemas.microsoft.com/office/powerpoint/2010/main" val="780523479"/>
+        <p14:creationId xmlns:p14="http://schemas.microsoft.com/office/powerpoint/2010/main" val="3325417849"/>
       </p:ext>
     </p:extLst>
   </p:cSld>
@@ -687,13 +695,16 @@
           <a:p>
             <a:r>
               <a:rPr lang="en-US" dirty="0"/>
-              <a:t>Adding a key (order is alphabetical, </a:t>
+              <a:t>Adding a key (</a:t>
             </a:r>
             <a:r>
-              <a:rPr lang="en-US"/>
-              <a:t>case insensitive)</a:t>
+              <a:rPr lang="en-US" dirty="0" err="1"/>
+              <a:t>Calo</a:t>
             </a:r>
-            <a:endParaRPr lang="en-US" dirty="0"/>
+            <a:r>
+              <a:rPr lang="en-US" dirty="0"/>
+              <a:t> on the left, Muon on the right, order is alphabetical)</a:t>
+            </a:r>
           </a:p>
         </p:txBody>
       </p:sp>
@@ -723,7 +734,7 @@
     </p:spTree>
     <p:extLst>
       <p:ext uri="{BB962C8B-B14F-4D97-AF65-F5344CB8AC3E}">
-        <p14:creationId xmlns:p14="http://schemas.microsoft.com/office/powerpoint/2010/main" val="3074547214"/>
+        <p14:creationId xmlns:p14="http://schemas.microsoft.com/office/powerpoint/2010/main" val="1521209228"/>
       </p:ext>
     </p:extLst>
   </p:cSld>
@@ -864,7 +875,7 @@
           <a:p>
             <a:fld id="{7AFAB9AC-57A8-D14F-9B7F-75706FB83332}" type="datetimeFigureOut">
               <a:rPr lang="en-US" smtClean="0"/>
-              <a:t>4/2/20</a:t>
+              <a:t>4/3/20</a:t>
             </a:fld>
             <a:endParaRPr lang="en-US"/>
           </a:p>
@@ -1034,7 +1045,7 @@
           <a:p>
             <a:fld id="{7AFAB9AC-57A8-D14F-9B7F-75706FB83332}" type="datetimeFigureOut">
               <a:rPr lang="en-US" smtClean="0"/>
-              <a:t>4/2/20</a:t>
+              <a:t>4/3/20</a:t>
             </a:fld>
             <a:endParaRPr lang="en-US"/>
           </a:p>
@@ -1214,7 +1225,7 @@
           <a:p>
             <a:fld id="{7AFAB9AC-57A8-D14F-9B7F-75706FB83332}" type="datetimeFigureOut">
               <a:rPr lang="en-US" smtClean="0"/>
-              <a:t>4/2/20</a:t>
+              <a:t>4/3/20</a:t>
             </a:fld>
             <a:endParaRPr lang="en-US"/>
           </a:p>
@@ -1384,7 +1395,7 @@
           <a:p>
             <a:fld id="{7AFAB9AC-57A8-D14F-9B7F-75706FB83332}" type="datetimeFigureOut">
               <a:rPr lang="en-US" smtClean="0"/>
-              <a:t>4/2/20</a:t>
+              <a:t>4/3/20</a:t>
             </a:fld>
             <a:endParaRPr lang="en-US"/>
           </a:p>
@@ -1628,7 +1639,7 @@
           <a:p>
             <a:fld id="{7AFAB9AC-57A8-D14F-9B7F-75706FB83332}" type="datetimeFigureOut">
               <a:rPr lang="en-US" smtClean="0"/>
-              <a:t>4/2/20</a:t>
+              <a:t>4/3/20</a:t>
             </a:fld>
             <a:endParaRPr lang="en-US"/>
           </a:p>
@@ -1860,7 +1871,7 @@
           <a:p>
             <a:fld id="{7AFAB9AC-57A8-D14F-9B7F-75706FB83332}" type="datetimeFigureOut">
               <a:rPr lang="en-US" smtClean="0"/>
-              <a:t>4/2/20</a:t>
+              <a:t>4/3/20</a:t>
             </a:fld>
             <a:endParaRPr lang="en-US"/>
           </a:p>
@@ -2227,7 +2238,7 @@
           <a:p>
             <a:fld id="{7AFAB9AC-57A8-D14F-9B7F-75706FB83332}" type="datetimeFigureOut">
               <a:rPr lang="en-US" smtClean="0"/>
-              <a:t>4/2/20</a:t>
+              <a:t>4/3/20</a:t>
             </a:fld>
             <a:endParaRPr lang="en-US"/>
           </a:p>
@@ -2345,7 +2356,7 @@
           <a:p>
             <a:fld id="{7AFAB9AC-57A8-D14F-9B7F-75706FB83332}" type="datetimeFigureOut">
               <a:rPr lang="en-US" smtClean="0"/>
-              <a:t>4/2/20</a:t>
+              <a:t>4/3/20</a:t>
             </a:fld>
             <a:endParaRPr lang="en-US"/>
           </a:p>
@@ -2440,7 +2451,7 @@
           <a:p>
             <a:fld id="{7AFAB9AC-57A8-D14F-9B7F-75706FB83332}" type="datetimeFigureOut">
               <a:rPr lang="en-US" smtClean="0"/>
-              <a:t>4/2/20</a:t>
+              <a:t>4/3/20</a:t>
             </a:fld>
             <a:endParaRPr lang="en-US"/>
           </a:p>
@@ -2717,7 +2728,7 @@
           <a:p>
             <a:fld id="{7AFAB9AC-57A8-D14F-9B7F-75706FB83332}" type="datetimeFigureOut">
               <a:rPr lang="en-US" smtClean="0"/>
-              <a:t>4/2/20</a:t>
+              <a:t>4/3/20</a:t>
             </a:fld>
             <a:endParaRPr lang="en-US"/>
           </a:p>
@@ -2974,7 +2985,7 @@
           <a:p>
             <a:fld id="{7AFAB9AC-57A8-D14F-9B7F-75706FB83332}" type="datetimeFigureOut">
               <a:rPr lang="en-US" smtClean="0"/>
-              <a:t>4/2/20</a:t>
+              <a:t>4/3/20</a:t>
             </a:fld>
             <a:endParaRPr lang="en-US"/>
           </a:p>
@@ -3187,7 +3198,7 @@
           <a:p>
             <a:fld id="{7AFAB9AC-57A8-D14F-9B7F-75706FB83332}" type="datetimeFigureOut">
               <a:rPr lang="en-US" smtClean="0"/>
-              <a:t>4/2/20</a:t>
+              <a:t>4/3/20</a:t>
             </a:fld>
             <a:endParaRPr lang="en-US"/>
           </a:p>
@@ -11382,8 +11393,8 @@
             </p:nvSpPr>
             <p:spPr>
               <a:xfrm>
-                <a:off x="16018" y="5696446"/>
-                <a:ext cx="1812539" cy="1200329"/>
+                <a:off x="-35373" y="5674417"/>
+                <a:ext cx="2049281" cy="1200329"/>
               </a:xfrm>
               <a:prstGeom prst="rect">
                 <a:avLst/>
@@ -11398,24 +11409,24 @@
               <a:p>
                 <a:pPr algn="just"/>
                 <a:r>
-                  <a:rPr lang="en-US" sz="800" dirty="0">
+                  <a:rPr lang="en-US" sz="900" dirty="0">
                     <a:latin typeface="Source Sans Pro" panose="020B0503030403020204" pitchFamily="34" charset="0"/>
                     <a:ea typeface="Source Sans Pro" panose="020B0503030403020204" pitchFamily="34" charset="0"/>
                   </a:rPr>
-                  <a:t>Key:</a:t>
+                  <a:t>Key (Calorimeter Trigger):</a:t>
                 </a:r>
               </a:p>
               <a:p>
                 <a:pPr algn="just"/>
                 <a:r>
-                  <a:rPr lang="en-US" sz="800" b="1" dirty="0">
+                  <a:rPr lang="en-US" sz="900" b="1" dirty="0">
                     <a:latin typeface="Source Sans Pro" panose="020B0503030403020204" pitchFamily="34" charset="0"/>
                     <a:ea typeface="Source Sans Pro" panose="020B0503030403020204" pitchFamily="34" charset="0"/>
                   </a:rPr>
                   <a:t>ECAL</a:t>
                 </a:r>
                 <a:r>
-                  <a:rPr lang="en-US" sz="800" dirty="0">
+                  <a:rPr lang="en-US" sz="900" dirty="0">
                     <a:latin typeface="Source Sans Pro" panose="020B0503030403020204" pitchFamily="34" charset="0"/>
                     <a:ea typeface="Source Sans Pro" panose="020B0503030403020204" pitchFamily="34" charset="0"/>
                   </a:rPr>
@@ -11425,14 +11436,38 @@
               <a:p>
                 <a:pPr algn="just"/>
                 <a:r>
-                  <a:rPr lang="en-US" sz="800" b="1" dirty="0">
+                  <a:rPr lang="en-US" sz="900" b="1" dirty="0" err="1">
+                    <a:latin typeface="Source Sans Pro" panose="020B0503030403020204" pitchFamily="34" charset="0"/>
+                    <a:ea typeface="Source Sans Pro" panose="020B0503030403020204" pitchFamily="34" charset="0"/>
+                  </a:rPr>
+                  <a:t>oSLB</a:t>
+                </a:r>
+                <a:r>
+                  <a:rPr lang="en-US" sz="900" b="1" dirty="0">
+                    <a:latin typeface="Source Sans Pro" panose="020B0503030403020204" pitchFamily="34" charset="0"/>
+                    <a:ea typeface="Source Sans Pro" panose="020B0503030403020204" pitchFamily="34" charset="0"/>
+                  </a:rPr>
+                  <a:t> </a:t>
+                </a:r>
+                <a:r>
+                  <a:rPr lang="en-US" sz="900" dirty="0">
+                    <a:latin typeface="Source Sans Pro" panose="020B0503030403020204" pitchFamily="34" charset="0"/>
+                    <a:ea typeface="Source Sans Pro" panose="020B0503030403020204" pitchFamily="34" charset="0"/>
+                  </a:rPr>
+                  <a:t>optical sync. and link board</a:t>
+                </a:r>
+              </a:p>
+              <a:p>
+                <a:pPr algn="just"/>
+                <a:r>
+                  <a:rPr lang="en-US" sz="900" b="1" dirty="0">
                     <a:latin typeface="Source Sans Pro" panose="020B0503030403020204" pitchFamily="34" charset="0"/>
                     <a:ea typeface="Source Sans Pro" panose="020B0503030403020204" pitchFamily="34" charset="0"/>
                   </a:rPr>
                   <a:t>HCAL</a:t>
                 </a:r>
                 <a:r>
-                  <a:rPr lang="en-US" sz="800" dirty="0">
+                  <a:rPr lang="en-US" sz="900" dirty="0">
                     <a:latin typeface="Source Sans Pro" panose="020B0503030403020204" pitchFamily="34" charset="0"/>
                     <a:ea typeface="Source Sans Pro" panose="020B0503030403020204" pitchFamily="34" charset="0"/>
                   </a:rPr>
@@ -11442,38 +11477,14 @@
               <a:p>
                 <a:pPr algn="just"/>
                 <a:r>
-                  <a:rPr lang="en-US" sz="800" b="1" dirty="0" err="1">
-                    <a:latin typeface="Source Sans Pro" panose="020B0503030403020204" pitchFamily="34" charset="0"/>
-                    <a:ea typeface="Source Sans Pro" panose="020B0503030403020204" pitchFamily="34" charset="0"/>
-                  </a:rPr>
-                  <a:t>oSLB</a:t>
-                </a:r>
-                <a:r>
-                  <a:rPr lang="en-US" sz="800" b="1" dirty="0">
-                    <a:latin typeface="Source Sans Pro" panose="020B0503030403020204" pitchFamily="34" charset="0"/>
-                    <a:ea typeface="Source Sans Pro" panose="020B0503030403020204" pitchFamily="34" charset="0"/>
-                  </a:rPr>
-                  <a:t> </a:t>
-                </a:r>
-                <a:r>
-                  <a:rPr lang="en-US" sz="800" dirty="0">
-                    <a:latin typeface="Source Sans Pro" panose="020B0503030403020204" pitchFamily="34" charset="0"/>
-                    <a:ea typeface="Source Sans Pro" panose="020B0503030403020204" pitchFamily="34" charset="0"/>
-                  </a:rPr>
-                  <a:t>optical sync. and link board</a:t>
-                </a:r>
-              </a:p>
-              <a:p>
-                <a:pPr algn="just"/>
-                <a:r>
-                  <a:rPr lang="en-US" sz="800" b="1" dirty="0">
+                  <a:rPr lang="en-US" sz="900" b="1" dirty="0">
                     <a:latin typeface="Source Sans Pro" panose="020B0503030403020204" pitchFamily="34" charset="0"/>
                     <a:ea typeface="Source Sans Pro" panose="020B0503030403020204" pitchFamily="34" charset="0"/>
                   </a:rPr>
                   <a:t>HB</a:t>
                 </a:r>
                 <a:r>
-                  <a:rPr lang="en-US" sz="800" dirty="0">
+                  <a:rPr lang="en-US" sz="900" dirty="0">
                     <a:latin typeface="Source Sans Pro" panose="020B0503030403020204" pitchFamily="34" charset="0"/>
                     <a:ea typeface="Source Sans Pro" panose="020B0503030403020204" pitchFamily="34" charset="0"/>
                   </a:rPr>
@@ -11483,14 +11494,14 @@
               <a:p>
                 <a:pPr algn="just"/>
                 <a:r>
-                  <a:rPr lang="en-US" sz="800" b="1" dirty="0">
+                  <a:rPr lang="en-US" sz="900" b="1" dirty="0">
                     <a:latin typeface="Source Sans Pro" panose="020B0503030403020204" pitchFamily="34" charset="0"/>
                     <a:ea typeface="Source Sans Pro" panose="020B0503030403020204" pitchFamily="34" charset="0"/>
                   </a:rPr>
                   <a:t>HE</a:t>
                 </a:r>
                 <a:r>
-                  <a:rPr lang="en-US" sz="800" dirty="0">
+                  <a:rPr lang="en-US" sz="900" dirty="0">
                     <a:latin typeface="Source Sans Pro" panose="020B0503030403020204" pitchFamily="34" charset="0"/>
                     <a:ea typeface="Source Sans Pro" panose="020B0503030403020204" pitchFamily="34" charset="0"/>
                   </a:rPr>
@@ -11500,14 +11511,14 @@
               <a:p>
                 <a:pPr algn="just"/>
                 <a:r>
-                  <a:rPr lang="en-US" sz="800" b="1" dirty="0">
+                  <a:rPr lang="en-US" sz="900" b="1" dirty="0">
                     <a:latin typeface="Source Sans Pro" panose="020B0503030403020204" pitchFamily="34" charset="0"/>
                     <a:ea typeface="Source Sans Pro" panose="020B0503030403020204" pitchFamily="34" charset="0"/>
                   </a:rPr>
                   <a:t>HF</a:t>
                 </a:r>
                 <a:r>
-                  <a:rPr lang="en-US" sz="800" dirty="0">
+                  <a:rPr lang="en-US" sz="900" dirty="0">
                     <a:latin typeface="Source Sans Pro" panose="020B0503030403020204" pitchFamily="34" charset="0"/>
                     <a:ea typeface="Source Sans Pro" panose="020B0503030403020204" pitchFamily="34" charset="0"/>
                   </a:rPr>
@@ -11519,7 +11530,7 @@
                 <a14:m>
                   <m:oMath xmlns:m="http://schemas.openxmlformats.org/officeDocument/2006/math">
                     <m:r>
-                      <a:rPr lang="en-US" sz="800" b="1" i="1">
+                      <a:rPr lang="en-US" sz="900" b="1" i="1">
                         <a:latin typeface="Cambria Math" panose="02040503050406030204" pitchFamily="18" charset="0"/>
                         <a:ea typeface="Cambria Math" panose="02040503050406030204" pitchFamily="18" charset="0"/>
                       </a:rPr>
@@ -11528,14 +11539,14 @@
                   </m:oMath>
                 </a14:m>
                 <a:r>
-                  <a:rPr lang="en-US" sz="800" b="1" dirty="0">
+                  <a:rPr lang="en-US" sz="900" b="1" dirty="0">
                     <a:latin typeface="Source Sans Pro" panose="020B0503030403020204" pitchFamily="34" charset="0"/>
                     <a:ea typeface="Source Sans Pro" panose="020B0503030403020204" pitchFamily="34" charset="0"/>
                   </a:rPr>
                   <a:t>HTR</a:t>
                 </a:r>
                 <a:r>
-                  <a:rPr lang="en-US" sz="800" dirty="0">
+                  <a:rPr lang="en-US" sz="900" dirty="0">
                     <a:latin typeface="Source Sans Pro" panose="020B0503030403020204" pitchFamily="34" charset="0"/>
                     <a:ea typeface="Source Sans Pro" panose="020B0503030403020204" pitchFamily="34" charset="0"/>
                   </a:rPr>
@@ -11547,7 +11558,7 @@
                       <m:rPr>
                         <m:sty m:val="p"/>
                       </m:rPr>
-                      <a:rPr lang="en-US" sz="800">
+                      <a:rPr lang="en-US" sz="900">
                         <a:latin typeface="Cambria Math" panose="02040503050406030204" pitchFamily="18" charset="0"/>
                         <a:ea typeface="Cambria Math" panose="02040503050406030204" pitchFamily="18" charset="0"/>
                       </a:rPr>
@@ -11556,28 +11567,11 @@
                   </m:oMath>
                 </a14:m>
                 <a:r>
-                  <a:rPr lang="en-US" sz="800" dirty="0">
+                  <a:rPr lang="en-US" sz="900" dirty="0">
                     <a:latin typeface="Source Sans Pro" panose="020B0503030403020204" pitchFamily="34" charset="0"/>
                     <a:ea typeface="Source Sans Pro" panose="020B0503030403020204" pitchFamily="34" charset="0"/>
                   </a:rPr>
                   <a:t>TCA HCAL trigger &amp; readout</a:t>
-                </a:r>
-              </a:p>
-              <a:p>
-                <a:pPr algn="just"/>
-                <a:r>
-                  <a:rPr lang="en-US" sz="800" b="1" dirty="0">
-                    <a:latin typeface="Source Sans Pro" panose="020B0503030403020204" pitchFamily="34" charset="0"/>
-                    <a:ea typeface="Source Sans Pro" panose="020B0503030403020204" pitchFamily="34" charset="0"/>
-                  </a:rPr>
-                  <a:t>CSC</a:t>
-                </a:r>
-                <a:r>
-                  <a:rPr lang="en-US" sz="800" dirty="0">
-                    <a:latin typeface="Source Sans Pro" panose="020B0503030403020204" pitchFamily="34" charset="0"/>
-                    <a:ea typeface="Source Sans Pro" panose="020B0503030403020204" pitchFamily="34" charset="0"/>
-                  </a:rPr>
-                  <a:t> cathode strip chamber</a:t>
                 </a:r>
               </a:p>
             </p:txBody>
@@ -11600,8 +11594,8 @@
             </p:nvSpPr>
             <p:spPr>
               <a:xfrm>
-                <a:off x="16018" y="5696446"/>
-                <a:ext cx="1812539" cy="1200329"/>
+                <a:off x="-35373" y="5674417"/>
+                <a:ext cx="2049281" cy="1200329"/>
               </a:xfrm>
               <a:prstGeom prst="rect">
                 <a:avLst/>
@@ -11628,14 +11622,97 @@
           </p:sp>
         </mc:Fallback>
       </mc:AlternateContent>
+      <p:sp>
+        <p:nvSpPr>
+          <p:cNvPr id="79" name="TextBox 78">
+            <a:extLst>
+              <a:ext uri="{FF2B5EF4-FFF2-40B4-BE49-F238E27FC236}">
+                <a16:creationId xmlns:a16="http://schemas.microsoft.com/office/drawing/2014/main" id="{A804AFA0-A253-1449-9913-4EEC27824F6D}"/>
+              </a:ext>
+            </a:extLst>
+          </p:cNvPr>
+          <p:cNvSpPr txBox="1"/>
+          <p:nvPr/>
+        </p:nvSpPr>
+        <p:spPr>
+          <a:xfrm>
+            <a:off x="5809754" y="3186473"/>
+            <a:ext cx="1611563" cy="523220"/>
+          </a:xfrm>
+          <a:prstGeom prst="rect">
+            <a:avLst/>
+          </a:prstGeom>
+          <a:noFill/>
+        </p:spPr>
+        <p:txBody>
+          <a:bodyPr wrap="square" rtlCol="0">
+            <a:spAutoFit/>
+          </a:bodyPr>
+          <a:lstStyle/>
+          <a:p>
+            <a:pPr algn="ctr"/>
+            <a:r>
+              <a:rPr lang="en-US" sz="1400" dirty="0">
+                <a:latin typeface="Source Sans Pro" panose="020F0502020204030204" pitchFamily="34" charset="0"/>
+                <a:ea typeface="Source Sans Pro" panose="020F0502020204030204" pitchFamily="34" charset="0"/>
+              </a:rPr>
+              <a:t>Muon Track-Finder Layer</a:t>
+            </a:r>
+          </a:p>
+        </p:txBody>
+      </p:sp>
+      <p:cxnSp>
+        <p:nvCxnSpPr>
+          <p:cNvPr id="88" name="Straight Arrow Connector 87">
+            <a:extLst>
+              <a:ext uri="{FF2B5EF4-FFF2-40B4-BE49-F238E27FC236}">
+                <a16:creationId xmlns:a16="http://schemas.microsoft.com/office/drawing/2014/main" id="{5513BE76-AC81-0647-978C-078A81E9B743}"/>
+              </a:ext>
+            </a:extLst>
+          </p:cNvPr>
+          <p:cNvCxnSpPr>
+            <a:cxnSpLocks/>
+          </p:cNvCxnSpPr>
+          <p:nvPr/>
+        </p:nvCxnSpPr>
+        <p:spPr>
+          <a:xfrm>
+            <a:off x="4795098" y="5865990"/>
+            <a:ext cx="0" cy="347878"/>
+          </a:xfrm>
+          <a:prstGeom prst="straightConnector1">
+            <a:avLst/>
+          </a:prstGeom>
+          <a:ln w="12700">
+            <a:solidFill>
+              <a:schemeClr val="tx1"/>
+            </a:solidFill>
+            <a:tailEnd type="triangle"/>
+          </a:ln>
+        </p:spPr>
+        <p:style>
+          <a:lnRef idx="1">
+            <a:schemeClr val="accent1"/>
+          </a:lnRef>
+          <a:fillRef idx="0">
+            <a:schemeClr val="accent1"/>
+          </a:fillRef>
+          <a:effectRef idx="0">
+            <a:schemeClr val="accent1"/>
+          </a:effectRef>
+          <a:fontRef idx="minor">
+            <a:schemeClr val="tx1"/>
+          </a:fontRef>
+        </p:style>
+      </p:cxnSp>
       <mc:AlternateContent xmlns:mc="http://schemas.openxmlformats.org/markup-compatibility/2006" xmlns:a14="http://schemas.microsoft.com/office/drawing/2010/main">
         <mc:Choice Requires="a14">
           <p:sp>
             <p:nvSpPr>
-              <p:cNvPr id="8" name="TextBox 7">
+              <p:cNvPr id="80" name="TextBox 79">
                 <a:extLst>
                   <a:ext uri="{FF2B5EF4-FFF2-40B4-BE49-F238E27FC236}">
-                    <a16:creationId xmlns:a16="http://schemas.microsoft.com/office/drawing/2014/main" id="{85D4286F-E275-F344-8CB4-E684B8B9A2BD}"/>
+                    <a16:creationId xmlns:a16="http://schemas.microsoft.com/office/drawing/2014/main" id="{F02EDB2E-FBCB-CF4F-A396-75E745CA18F6}"/>
                   </a:ext>
                 </a:extLst>
               </p:cNvPr>
@@ -11644,8 +11721,8 @@
             </p:nvSpPr>
             <p:spPr>
               <a:xfrm>
-                <a:off x="1806259" y="5946651"/>
-                <a:ext cx="1672253" cy="954107"/>
+                <a:off x="7329049" y="5535675"/>
+                <a:ext cx="1947444" cy="1338828"/>
               </a:xfrm>
               <a:prstGeom prst="rect">
                 <a:avLst/>
@@ -11653,21 +11730,48 @@
               <a:noFill/>
             </p:spPr>
             <p:txBody>
-              <a:bodyPr wrap="none" rtlCol="0">
+              <a:bodyPr wrap="square" numCol="1" rtlCol="0">
                 <a:spAutoFit/>
               </a:bodyPr>
               <a:lstStyle/>
               <a:p>
                 <a:pPr algn="just"/>
                 <a:r>
-                  <a:rPr lang="en-US" sz="800" b="1" dirty="0">
+                  <a:rPr lang="en-US" sz="900" dirty="0">
+                    <a:latin typeface="Source Sans Pro" panose="020B0503030403020204" pitchFamily="34" charset="0"/>
+                    <a:ea typeface="Source Sans Pro" panose="020B0503030403020204" pitchFamily="34" charset="0"/>
+                  </a:rPr>
+                  <a:t>Key (Muon Trigger):</a:t>
+                </a:r>
+              </a:p>
+              <a:p>
+                <a:pPr algn="just"/>
+                <a:r>
+                  <a:rPr lang="en-US" sz="900" b="1" dirty="0">
+                    <a:latin typeface="Source Sans Pro" panose="020B0503030403020204" pitchFamily="34" charset="0"/>
+                    <a:ea typeface="Source Sans Pro" panose="020B0503030403020204" pitchFamily="34" charset="0"/>
+                  </a:rPr>
+                  <a:t>CSC</a:t>
+                </a:r>
+                <a:r>
+                  <a:rPr lang="en-US" sz="900" dirty="0">
+                    <a:latin typeface="Source Sans Pro" panose="020B0503030403020204" pitchFamily="34" charset="0"/>
+                    <a:ea typeface="Source Sans Pro" panose="020B0503030403020204" pitchFamily="34" charset="0"/>
+                  </a:rPr>
+                  <a:t> cathode strip chamber</a:t>
+                </a:r>
+              </a:p>
+              <a:p>
+                <a:pPr algn="just"/>
+                <a:r>
+                  <a:rPr lang="en-US" sz="900" b="1" dirty="0">
                     <a:latin typeface="Source Sans Pro" panose="020B0503030403020204" pitchFamily="34" charset="0"/>
                     <a:ea typeface="Source Sans Pro" panose="020B0503030403020204" pitchFamily="34" charset="0"/>
                   </a:rPr>
                   <a:t>DT</a:t>
                 </a:r>
                 <a:r>
-                  <a:rPr lang="en-US" sz="800" dirty="0">
+                  <a:rPr lang="en-US" sz="900" dirty="0">
                     <a:latin typeface="Source Sans Pro" panose="020B0503030403020204" pitchFamily="34" charset="0"/>
                     <a:ea typeface="Source Sans Pro" panose="020B0503030403020204" pitchFamily="34" charset="0"/>
                   </a:rPr>
@@ -11677,28 +11781,28 @@
               <a:p>
                 <a:pPr algn="just"/>
                 <a:r>
-                  <a:rPr lang="en-US" sz="800" b="1" dirty="0" err="1">
+                  <a:rPr lang="en-US" sz="900" b="1" dirty="0" err="1">
                     <a:latin typeface="Source Sans Pro" panose="020B0503030403020204" pitchFamily="34" charset="0"/>
                     <a:ea typeface="Source Sans Pro" panose="020B0503030403020204" pitchFamily="34" charset="0"/>
                   </a:rPr>
                   <a:t>CuOF</a:t>
                 </a:r>
                 <a:r>
-                  <a:rPr lang="en-US" sz="800" dirty="0">
+                  <a:rPr lang="en-US" sz="900" dirty="0">
                     <a:latin typeface="Source Sans Pro" panose="020B0503030403020204" pitchFamily="34" charset="0"/>
                     <a:ea typeface="Source Sans Pro" panose="020B0503030403020204" pitchFamily="34" charset="0"/>
                   </a:rPr>
                   <a:t> copper to optical </a:t>
                 </a:r>
                 <a:r>
-                  <a:rPr lang="en-US" sz="800" dirty="0" err="1">
+                  <a:rPr lang="en-US" sz="900" dirty="0" err="1">
                     <a:latin typeface="Source Sans Pro" panose="020B0503030403020204" pitchFamily="34" charset="0"/>
                     <a:ea typeface="Source Sans Pro" panose="020B0503030403020204" pitchFamily="34" charset="0"/>
                   </a:rPr>
                   <a:t>fibre</a:t>
                 </a:r>
                 <a:r>
-                  <a:rPr lang="en-US" sz="800" dirty="0">
+                  <a:rPr lang="en-US" sz="900" dirty="0">
                     <a:latin typeface="Source Sans Pro" panose="020B0503030403020204" pitchFamily="34" charset="0"/>
                     <a:ea typeface="Source Sans Pro" panose="020B0503030403020204" pitchFamily="34" charset="0"/>
                   </a:rPr>
@@ -11708,14 +11812,14 @@
               <a:p>
                 <a:pPr algn="just"/>
                 <a:r>
-                  <a:rPr lang="en-US" sz="800" b="1" dirty="0">
+                  <a:rPr lang="en-US" sz="900" b="1" dirty="0">
                     <a:latin typeface="Source Sans Pro" panose="020B0503030403020204" pitchFamily="34" charset="0"/>
                     <a:ea typeface="Source Sans Pro" panose="020B0503030403020204" pitchFamily="34" charset="0"/>
                   </a:rPr>
                   <a:t>RPC</a:t>
                 </a:r>
                 <a:r>
-                  <a:rPr lang="en-US" sz="800" dirty="0">
+                  <a:rPr lang="en-US" sz="900" dirty="0">
                     <a:latin typeface="Source Sans Pro" panose="020B0503030403020204" pitchFamily="34" charset="0"/>
                     <a:ea typeface="Source Sans Pro" panose="020B0503030403020204" pitchFamily="34" charset="0"/>
                   </a:rPr>
@@ -11725,14 +11829,31 @@
               <a:p>
                 <a:pPr algn="just"/>
                 <a:r>
-                  <a:rPr lang="en-US" sz="800" b="1" dirty="0">
+                  <a:rPr lang="en-US" sz="900" b="1" dirty="0">
+                    <a:latin typeface="Source Sans Pro" panose="020B0503030403020204" pitchFamily="34" charset="0"/>
+                    <a:ea typeface="Source Sans Pro" panose="020B0503030403020204" pitchFamily="34" charset="0"/>
+                  </a:rPr>
+                  <a:t>MPC</a:t>
+                </a:r>
+                <a:r>
+                  <a:rPr lang="en-US" sz="900" dirty="0">
+                    <a:latin typeface="Source Sans Pro" panose="020B0503030403020204" pitchFamily="34" charset="0"/>
+                    <a:ea typeface="Source Sans Pro" panose="020B0503030403020204" pitchFamily="34" charset="0"/>
+                  </a:rPr>
+                  <a:t> muon port card</a:t>
+                </a:r>
+              </a:p>
+              <a:p>
+                <a:pPr algn="just"/>
+                <a:r>
+                  <a:rPr lang="en-US" sz="900" b="1" dirty="0">
                     <a:latin typeface="Source Sans Pro" panose="020B0503030403020204" pitchFamily="34" charset="0"/>
                     <a:ea typeface="Source Sans Pro" panose="020B0503030403020204" pitchFamily="34" charset="0"/>
                   </a:rPr>
                   <a:t>LB </a:t>
                 </a:r>
                 <a:r>
-                  <a:rPr lang="en-US" sz="800" dirty="0">
+                  <a:rPr lang="en-US" sz="900" dirty="0">
                     <a:latin typeface="Source Sans Pro" panose="020B0503030403020204" pitchFamily="34" charset="0"/>
                     <a:ea typeface="Source Sans Pro" panose="020B0503030403020204" pitchFamily="34" charset="0"/>
                   </a:rPr>
@@ -11742,31 +11863,14 @@
               <a:p>
                 <a:pPr algn="just"/>
                 <a:r>
-                  <a:rPr lang="en-US" sz="800" b="1" dirty="0">
-                    <a:latin typeface="Source Sans Pro" panose="020B0503030403020204" pitchFamily="34" charset="0"/>
-                    <a:ea typeface="Source Sans Pro" panose="020B0503030403020204" pitchFamily="34" charset="0"/>
-                  </a:rPr>
-                  <a:t>MPC</a:t>
-                </a:r>
-                <a:r>
-                  <a:rPr lang="en-US" sz="800" dirty="0">
-                    <a:latin typeface="Source Sans Pro" panose="020B0503030403020204" pitchFamily="34" charset="0"/>
-                    <a:ea typeface="Source Sans Pro" panose="020B0503030403020204" pitchFamily="34" charset="0"/>
-                  </a:rPr>
-                  <a:t> muon port card</a:t>
-                </a:r>
-              </a:p>
-              <a:p>
-                <a:pPr algn="just"/>
-                <a:r>
-                  <a:rPr lang="en-US" sz="800" b="1" dirty="0">
+                  <a:rPr lang="en-US" sz="900" b="1" dirty="0">
                     <a:latin typeface="Source Sans Pro" panose="020B0503030403020204" pitchFamily="34" charset="0"/>
                     <a:ea typeface="Source Sans Pro" panose="020B0503030403020204" pitchFamily="34" charset="0"/>
                   </a:rPr>
                   <a:t>SC</a:t>
                 </a:r>
                 <a:r>
-                  <a:rPr lang="en-US" sz="800" dirty="0">
+                  <a:rPr lang="en-US" sz="900" dirty="0">
                     <a:latin typeface="Source Sans Pro" panose="020B0503030403020204" pitchFamily="34" charset="0"/>
                     <a:ea typeface="Source Sans Pro" panose="020B0503030403020204" pitchFamily="34" charset="0"/>
                   </a:rPr>
@@ -11778,7 +11882,7 @@
                 <a14:m>
                   <m:oMath xmlns:m="http://schemas.openxmlformats.org/officeDocument/2006/math">
                     <m:r>
-                      <a:rPr lang="en-US" sz="800" b="1" i="1">
+                      <a:rPr lang="en-US" sz="900" b="1" i="1">
                         <a:latin typeface="Cambria Math" panose="02040503050406030204" pitchFamily="18" charset="0"/>
                         <a:ea typeface="Cambria Math" panose="02040503050406030204" pitchFamily="18" charset="0"/>
                       </a:rPr>
@@ -11787,14 +11891,14 @@
                   </m:oMath>
                 </a14:m>
                 <a:r>
-                  <a:rPr lang="en-US" sz="800" b="1" dirty="0">
+                  <a:rPr lang="en-US" sz="900" b="1" dirty="0">
                     <a:latin typeface="Source Sans Pro" panose="020B0503030403020204" pitchFamily="34" charset="0"/>
                     <a:ea typeface="Source Sans Pro" panose="020B0503030403020204" pitchFamily="34" charset="0"/>
                   </a:rPr>
                   <a:t>GMT</a:t>
                 </a:r>
                 <a:r>
-                  <a:rPr lang="en-US" sz="800" dirty="0">
+                  <a:rPr lang="en-US" sz="900" dirty="0">
                     <a:latin typeface="Source Sans Pro" panose="020B0503030403020204" pitchFamily="34" charset="0"/>
                     <a:ea typeface="Source Sans Pro" panose="020B0503030403020204" pitchFamily="34" charset="0"/>
                   </a:rPr>
@@ -11807,10 +11911,10 @@
         <mc:Fallback xmlns="">
           <p:sp>
             <p:nvSpPr>
-              <p:cNvPr id="8" name="TextBox 7">
+              <p:cNvPr id="80" name="TextBox 79">
                 <a:extLst>
                   <a:ext uri="{FF2B5EF4-FFF2-40B4-BE49-F238E27FC236}">
-                    <a16:creationId xmlns:a16="http://schemas.microsoft.com/office/drawing/2014/main" id="{85D4286F-E275-F344-8CB4-E684B8B9A2BD}"/>
+                    <a16:creationId xmlns:a16="http://schemas.microsoft.com/office/drawing/2014/main" id="{F02EDB2E-FBCB-CF4F-A396-75E745CA18F6}"/>
                   </a:ext>
                 </a:extLst>
               </p:cNvPr>
@@ -11821,8 +11925,8 @@
             </p:nvSpPr>
             <p:spPr>
               <a:xfrm>
-                <a:off x="1806259" y="5946651"/>
-                <a:ext cx="1672253" cy="954107"/>
+                <a:off x="7329049" y="5535675"/>
+                <a:ext cx="1947444" cy="1338828"/>
               </a:xfrm>
               <a:prstGeom prst="rect">
                 <a:avLst/>
@@ -11830,7 +11934,7 @@
               <a:blipFill>
                 <a:blip r:embed="rId7"/>
                 <a:stretch>
-                  <a:fillRect/>
+                  <a:fillRect b="-943"/>
                 </a:stretch>
               </a:blipFill>
             </p:spPr>
@@ -11849,93 +11953,10 @@
           </p:sp>
         </mc:Fallback>
       </mc:AlternateContent>
-      <p:sp>
-        <p:nvSpPr>
-          <p:cNvPr id="79" name="TextBox 78">
-            <a:extLst>
-              <a:ext uri="{FF2B5EF4-FFF2-40B4-BE49-F238E27FC236}">
-                <a16:creationId xmlns:a16="http://schemas.microsoft.com/office/drawing/2014/main" id="{A804AFA0-A253-1449-9913-4EEC27824F6D}"/>
-              </a:ext>
-            </a:extLst>
-          </p:cNvPr>
-          <p:cNvSpPr txBox="1"/>
-          <p:nvPr/>
-        </p:nvSpPr>
-        <p:spPr>
-          <a:xfrm>
-            <a:off x="5809754" y="3186473"/>
-            <a:ext cx="1611563" cy="523220"/>
-          </a:xfrm>
-          <a:prstGeom prst="rect">
-            <a:avLst/>
-          </a:prstGeom>
-          <a:noFill/>
-        </p:spPr>
-        <p:txBody>
-          <a:bodyPr wrap="square" rtlCol="0">
-            <a:spAutoFit/>
-          </a:bodyPr>
-          <a:lstStyle/>
-          <a:p>
-            <a:pPr algn="ctr"/>
-            <a:r>
-              <a:rPr lang="en-US" sz="1400" dirty="0">
-                <a:latin typeface="Source Sans Pro" panose="020F0502020204030204" pitchFamily="34" charset="0"/>
-                <a:ea typeface="Source Sans Pro" panose="020F0502020204030204" pitchFamily="34" charset="0"/>
-              </a:rPr>
-              <a:t>Muon Track-Finder Layer</a:t>
-            </a:r>
-          </a:p>
-        </p:txBody>
-      </p:sp>
-      <p:cxnSp>
-        <p:nvCxnSpPr>
-          <p:cNvPr id="88" name="Straight Arrow Connector 87">
-            <a:extLst>
-              <a:ext uri="{FF2B5EF4-FFF2-40B4-BE49-F238E27FC236}">
-                <a16:creationId xmlns:a16="http://schemas.microsoft.com/office/drawing/2014/main" id="{5513BE76-AC81-0647-978C-078A81E9B743}"/>
-              </a:ext>
-            </a:extLst>
-          </p:cNvPr>
-          <p:cNvCxnSpPr>
-            <a:cxnSpLocks/>
-          </p:cNvCxnSpPr>
-          <p:nvPr/>
-        </p:nvCxnSpPr>
-        <p:spPr>
-          <a:xfrm>
-            <a:off x="4795098" y="5865990"/>
-            <a:ext cx="0" cy="347878"/>
-          </a:xfrm>
-          <a:prstGeom prst="straightConnector1">
-            <a:avLst/>
-          </a:prstGeom>
-          <a:ln w="12700">
-            <a:solidFill>
-              <a:schemeClr val="tx1"/>
-            </a:solidFill>
-            <a:tailEnd type="triangle"/>
-          </a:ln>
-        </p:spPr>
-        <p:style>
-          <a:lnRef idx="1">
-            <a:schemeClr val="accent1"/>
-          </a:lnRef>
-          <a:fillRef idx="0">
-            <a:schemeClr val="accent1"/>
-          </a:fillRef>
-          <a:effectRef idx="0">
-            <a:schemeClr val="accent1"/>
-          </a:effectRef>
-          <a:fontRef idx="minor">
-            <a:schemeClr val="tx1"/>
-          </a:fontRef>
-        </p:style>
-      </p:cxnSp>
     </p:spTree>
     <p:extLst>
       <p:ext uri="{BB962C8B-B14F-4D97-AF65-F5344CB8AC3E}">
-        <p14:creationId xmlns:p14="http://schemas.microsoft.com/office/powerpoint/2010/main" val="124101213"/>
+        <p14:creationId xmlns:p14="http://schemas.microsoft.com/office/powerpoint/2010/main" val="1552069522"/>
       </p:ext>
     </p:extLst>
   </p:cSld>
@@ -15802,286 +15823,14 @@
           </a:p>
         </p:txBody>
       </p:sp>
-      <p:sp>
-        <p:nvSpPr>
-          <p:cNvPr id="79" name="TextBox 78">
-            <a:extLst>
-              <a:ext uri="{FF2B5EF4-FFF2-40B4-BE49-F238E27FC236}">
-                <a16:creationId xmlns:a16="http://schemas.microsoft.com/office/drawing/2014/main" id="{A804AFA0-A253-1449-9913-4EEC27824F6D}"/>
-              </a:ext>
-            </a:extLst>
-          </p:cNvPr>
-          <p:cNvSpPr txBox="1"/>
-          <p:nvPr/>
-        </p:nvSpPr>
-        <p:spPr>
-          <a:xfrm>
-            <a:off x="5809754" y="3186473"/>
-            <a:ext cx="1611563" cy="523220"/>
-          </a:xfrm>
-          <a:prstGeom prst="rect">
-            <a:avLst/>
-          </a:prstGeom>
-          <a:noFill/>
-        </p:spPr>
-        <p:txBody>
-          <a:bodyPr wrap="square" rtlCol="0">
-            <a:spAutoFit/>
-          </a:bodyPr>
-          <a:lstStyle/>
-          <a:p>
-            <a:pPr algn="ctr"/>
-            <a:r>
-              <a:rPr lang="en-US" sz="1400" dirty="0">
-                <a:latin typeface="Source Sans Pro" panose="020F0502020204030204" pitchFamily="34" charset="0"/>
-                <a:ea typeface="Source Sans Pro" panose="020F0502020204030204" pitchFamily="34" charset="0"/>
-              </a:rPr>
-              <a:t>Muon Track-Finder Layer</a:t>
-            </a:r>
-          </a:p>
-        </p:txBody>
-      </p:sp>
-      <p:cxnSp>
-        <p:nvCxnSpPr>
-          <p:cNvPr id="88" name="Straight Arrow Connector 87">
-            <a:extLst>
-              <a:ext uri="{FF2B5EF4-FFF2-40B4-BE49-F238E27FC236}">
-                <a16:creationId xmlns:a16="http://schemas.microsoft.com/office/drawing/2014/main" id="{5513BE76-AC81-0647-978C-078A81E9B743}"/>
-              </a:ext>
-            </a:extLst>
-          </p:cNvPr>
-          <p:cNvCxnSpPr>
-            <a:cxnSpLocks/>
-          </p:cNvCxnSpPr>
-          <p:nvPr/>
-        </p:nvCxnSpPr>
-        <p:spPr>
-          <a:xfrm>
-            <a:off x="4795098" y="5865990"/>
-            <a:ext cx="0" cy="347878"/>
-          </a:xfrm>
-          <a:prstGeom prst="straightConnector1">
-            <a:avLst/>
-          </a:prstGeom>
-          <a:ln w="12700">
-            <a:solidFill>
-              <a:schemeClr val="tx1"/>
-            </a:solidFill>
-            <a:tailEnd type="triangle"/>
-          </a:ln>
-        </p:spPr>
-        <p:style>
-          <a:lnRef idx="1">
-            <a:schemeClr val="accent1"/>
-          </a:lnRef>
-          <a:fillRef idx="0">
-            <a:schemeClr val="accent1"/>
-          </a:fillRef>
-          <a:effectRef idx="0">
-            <a:schemeClr val="accent1"/>
-          </a:effectRef>
-          <a:fontRef idx="minor">
-            <a:schemeClr val="tx1"/>
-          </a:fontRef>
-        </p:style>
-      </p:cxnSp>
-      <p:sp>
-        <p:nvSpPr>
-          <p:cNvPr id="80" name="TextBox 79">
-            <a:extLst>
-              <a:ext uri="{FF2B5EF4-FFF2-40B4-BE49-F238E27FC236}">
-                <a16:creationId xmlns:a16="http://schemas.microsoft.com/office/drawing/2014/main" id="{132BA7BB-4248-F94C-B893-820512DCF522}"/>
-              </a:ext>
-            </a:extLst>
-          </p:cNvPr>
-          <p:cNvSpPr txBox="1"/>
-          <p:nvPr/>
-        </p:nvSpPr>
-        <p:spPr>
-          <a:xfrm>
-            <a:off x="16018" y="5696446"/>
-            <a:ext cx="1812539" cy="1200329"/>
-          </a:xfrm>
-          <a:prstGeom prst="rect">
-            <a:avLst/>
-          </a:prstGeom>
-          <a:noFill/>
-        </p:spPr>
-        <p:txBody>
-          <a:bodyPr wrap="square" numCol="1" rtlCol="0">
-            <a:spAutoFit/>
-          </a:bodyPr>
-          <a:lstStyle/>
-          <a:p>
-            <a:pPr algn="just"/>
-            <a:r>
-              <a:rPr lang="en-US" sz="800" dirty="0">
-                <a:latin typeface="Source Sans Pro" panose="020B0503030403020204" pitchFamily="34" charset="0"/>
-                <a:ea typeface="Source Sans Pro" panose="020B0503030403020204" pitchFamily="34" charset="0"/>
-              </a:rPr>
-              <a:t>Key:</a:t>
-            </a:r>
-          </a:p>
-          <a:p>
-            <a:pPr algn="just"/>
-            <a:r>
-              <a:rPr lang="en-US" sz="800" b="1" dirty="0">
-                <a:latin typeface="Source Sans Pro" panose="020B0503030403020204" pitchFamily="34" charset="0"/>
-                <a:ea typeface="Source Sans Pro" panose="020B0503030403020204" pitchFamily="34" charset="0"/>
-              </a:rPr>
-              <a:t>CSC</a:t>
-            </a:r>
-            <a:r>
-              <a:rPr lang="en-US" sz="800" dirty="0">
-                <a:latin typeface="Source Sans Pro" panose="020B0503030403020204" pitchFamily="34" charset="0"/>
-                <a:ea typeface="Source Sans Pro" panose="020B0503030403020204" pitchFamily="34" charset="0"/>
-              </a:rPr>
-              <a:t> cathode strip chamber</a:t>
-            </a:r>
-          </a:p>
-          <a:p>
-            <a:pPr algn="just"/>
-            <a:r>
-              <a:rPr lang="en-US" sz="800" b="1" dirty="0" err="1">
-                <a:latin typeface="Source Sans Pro" panose="020B0503030403020204" pitchFamily="34" charset="0"/>
-                <a:ea typeface="Source Sans Pro" panose="020B0503030403020204" pitchFamily="34" charset="0"/>
-              </a:rPr>
-              <a:t>CuOF</a:t>
-            </a:r>
-            <a:r>
-              <a:rPr lang="en-US" sz="800" dirty="0">
-                <a:latin typeface="Source Sans Pro" panose="020B0503030403020204" pitchFamily="34" charset="0"/>
-                <a:ea typeface="Source Sans Pro" panose="020B0503030403020204" pitchFamily="34" charset="0"/>
-              </a:rPr>
-              <a:t> copper to optical </a:t>
-            </a:r>
-            <a:r>
-              <a:rPr lang="en-US" sz="800" dirty="0" err="1">
-                <a:latin typeface="Source Sans Pro" panose="020B0503030403020204" pitchFamily="34" charset="0"/>
-                <a:ea typeface="Source Sans Pro" panose="020B0503030403020204" pitchFamily="34" charset="0"/>
-              </a:rPr>
-              <a:t>fibre</a:t>
-            </a:r>
-            <a:r>
-              <a:rPr lang="en-US" sz="800" dirty="0">
-                <a:latin typeface="Source Sans Pro" panose="020B0503030403020204" pitchFamily="34" charset="0"/>
-                <a:ea typeface="Source Sans Pro" panose="020B0503030403020204" pitchFamily="34" charset="0"/>
-              </a:rPr>
-              <a:t> board</a:t>
-            </a:r>
-          </a:p>
-          <a:p>
-            <a:pPr algn="just"/>
-            <a:r>
-              <a:rPr lang="en-US" sz="800" b="1" dirty="0">
-                <a:latin typeface="Source Sans Pro" panose="020B0503030403020204" pitchFamily="34" charset="0"/>
-                <a:ea typeface="Source Sans Pro" panose="020B0503030403020204" pitchFamily="34" charset="0"/>
-              </a:rPr>
-              <a:t>DT</a:t>
-            </a:r>
-            <a:r>
-              <a:rPr lang="en-US" sz="800" dirty="0">
-                <a:latin typeface="Source Sans Pro" panose="020B0503030403020204" pitchFamily="34" charset="0"/>
-                <a:ea typeface="Source Sans Pro" panose="020B0503030403020204" pitchFamily="34" charset="0"/>
-              </a:rPr>
-              <a:t> drift tube</a:t>
-            </a:r>
-          </a:p>
-          <a:p>
-            <a:pPr algn="just"/>
-            <a:r>
-              <a:rPr lang="en-US" sz="800" b="1" dirty="0">
-                <a:latin typeface="Source Sans Pro" panose="020B0503030403020204" pitchFamily="34" charset="0"/>
-                <a:ea typeface="Source Sans Pro" panose="020B0503030403020204" pitchFamily="34" charset="0"/>
-              </a:rPr>
-              <a:t>ECAL</a:t>
-            </a:r>
-            <a:r>
-              <a:rPr lang="en-US" sz="800" dirty="0">
-                <a:latin typeface="Source Sans Pro" panose="020B0503030403020204" pitchFamily="34" charset="0"/>
-                <a:ea typeface="Source Sans Pro" panose="020B0503030403020204" pitchFamily="34" charset="0"/>
-              </a:rPr>
-              <a:t> electromagnetic calorimeter</a:t>
-            </a:r>
-          </a:p>
-          <a:p>
-            <a:pPr algn="just"/>
-            <a:r>
-              <a:rPr lang="en-US" sz="800" b="1" dirty="0">
-                <a:latin typeface="Source Sans Pro" panose="020B0503030403020204" pitchFamily="34" charset="0"/>
-                <a:ea typeface="Source Sans Pro" panose="020B0503030403020204" pitchFamily="34" charset="0"/>
-              </a:rPr>
-              <a:t>HB</a:t>
-            </a:r>
-            <a:r>
-              <a:rPr lang="en-US" sz="800" dirty="0">
-                <a:latin typeface="Source Sans Pro" panose="020B0503030403020204" pitchFamily="34" charset="0"/>
-                <a:ea typeface="Source Sans Pro" panose="020B0503030403020204" pitchFamily="34" charset="0"/>
-              </a:rPr>
-              <a:t> HCAL in barrel</a:t>
-            </a:r>
-          </a:p>
-          <a:p>
-            <a:pPr algn="just"/>
-            <a:r>
-              <a:rPr lang="en-US" sz="800" b="1" dirty="0">
-                <a:latin typeface="Source Sans Pro" panose="020B0503030403020204" pitchFamily="34" charset="0"/>
-                <a:ea typeface="Source Sans Pro" panose="020B0503030403020204" pitchFamily="34" charset="0"/>
-              </a:rPr>
-              <a:t>HCAL</a:t>
-            </a:r>
-            <a:r>
-              <a:rPr lang="en-US" sz="800" dirty="0">
-                <a:latin typeface="Source Sans Pro" panose="020B0503030403020204" pitchFamily="34" charset="0"/>
-                <a:ea typeface="Source Sans Pro" panose="020B0503030403020204" pitchFamily="34" charset="0"/>
-              </a:rPr>
-              <a:t> hadronic calorimeter</a:t>
-            </a:r>
-          </a:p>
-          <a:p>
-            <a:pPr algn="just"/>
-            <a:r>
-              <a:rPr lang="en-US" sz="800" b="1" dirty="0">
-                <a:latin typeface="Source Sans Pro" panose="020B0503030403020204" pitchFamily="34" charset="0"/>
-                <a:ea typeface="Source Sans Pro" panose="020B0503030403020204" pitchFamily="34" charset="0"/>
-              </a:rPr>
-              <a:t>HE</a:t>
-            </a:r>
-            <a:r>
-              <a:rPr lang="en-US" sz="800" dirty="0">
-                <a:latin typeface="Source Sans Pro" panose="020B0503030403020204" pitchFamily="34" charset="0"/>
-                <a:ea typeface="Source Sans Pro" panose="020B0503030403020204" pitchFamily="34" charset="0"/>
-              </a:rPr>
-              <a:t> HCAL in end cap</a:t>
-            </a:r>
-          </a:p>
-          <a:p>
-            <a:pPr algn="just"/>
-            <a:r>
-              <a:rPr lang="en-US" sz="800" b="1" dirty="0">
-                <a:latin typeface="Source Sans Pro" panose="020B0503030403020204" pitchFamily="34" charset="0"/>
-                <a:ea typeface="Source Sans Pro" panose="020B0503030403020204" pitchFamily="34" charset="0"/>
-              </a:rPr>
-              <a:t>HF</a:t>
-            </a:r>
-            <a:r>
-              <a:rPr lang="en-US" sz="800" dirty="0">
-                <a:latin typeface="Source Sans Pro" panose="020B0503030403020204" pitchFamily="34" charset="0"/>
-                <a:ea typeface="Source Sans Pro" panose="020B0503030403020204" pitchFamily="34" charset="0"/>
-              </a:rPr>
-              <a:t> hadron forward calorimeter</a:t>
-            </a:r>
-          </a:p>
-        </p:txBody>
-      </p:sp>
       <mc:AlternateContent xmlns:mc="http://schemas.openxmlformats.org/markup-compatibility/2006" xmlns:a14="http://schemas.microsoft.com/office/drawing/2010/main">
         <mc:Choice Requires="a14">
           <p:sp>
             <p:nvSpPr>
-              <p:cNvPr id="81" name="TextBox 80">
+              <p:cNvPr id="2" name="TextBox 1">
                 <a:extLst>
                   <a:ext uri="{FF2B5EF4-FFF2-40B4-BE49-F238E27FC236}">
-                    <a16:creationId xmlns:a16="http://schemas.microsoft.com/office/drawing/2014/main" id="{F568889C-9ADC-0242-9A10-DDC9ECA75765}"/>
+                    <a16:creationId xmlns:a16="http://schemas.microsoft.com/office/drawing/2014/main" id="{799B501A-CF66-1343-B29F-D23F4771E8B9}"/>
                   </a:ext>
                 </a:extLst>
               </p:cNvPr>
@@ -16090,8 +15839,8 @@
             </p:nvSpPr>
             <p:spPr>
               <a:xfrm>
-                <a:off x="1796641" y="5942668"/>
-                <a:ext cx="1691489" cy="954107"/>
+                <a:off x="-35373" y="5674417"/>
+                <a:ext cx="2049281" cy="1200329"/>
               </a:xfrm>
               <a:prstGeom prst="rect">
                 <a:avLst/>
@@ -16099,62 +15848,116 @@
               <a:noFill/>
             </p:spPr>
             <p:txBody>
-              <a:bodyPr wrap="none" rtlCol="0">
+              <a:bodyPr wrap="square" numCol="1" rtlCol="0">
                 <a:spAutoFit/>
               </a:bodyPr>
               <a:lstStyle/>
               <a:p>
                 <a:pPr algn="just"/>
                 <a:r>
-                  <a:rPr lang="en-US" sz="800" b="1" dirty="0">
+                  <a:rPr lang="en-US" sz="900" dirty="0">
                     <a:latin typeface="Source Sans Pro" panose="020B0503030403020204" pitchFamily="34" charset="0"/>
                     <a:ea typeface="Source Sans Pro" panose="020B0503030403020204" pitchFamily="34" charset="0"/>
                   </a:rPr>
-                  <a:t>LB </a:t>
-                </a:r>
-                <a:r>
-                  <a:rPr lang="en-US" sz="800" dirty="0">
-                    <a:latin typeface="Source Sans Pro" panose="020B0503030403020204" pitchFamily="34" charset="0"/>
-                    <a:ea typeface="Source Sans Pro" panose="020B0503030403020204" pitchFamily="34" charset="0"/>
-                  </a:rPr>
-                  <a:t>link board</a:t>
+                  <a:t>Key (Calorimeter Trigger):</a:t>
                 </a:r>
               </a:p>
               <a:p>
                 <a:pPr algn="just"/>
                 <a:r>
-                  <a:rPr lang="en-US" sz="800" b="1" dirty="0">
+                  <a:rPr lang="en-US" sz="900" b="1" dirty="0">
                     <a:latin typeface="Source Sans Pro" panose="020B0503030403020204" pitchFamily="34" charset="0"/>
                     <a:ea typeface="Source Sans Pro" panose="020B0503030403020204" pitchFamily="34" charset="0"/>
                   </a:rPr>
-                  <a:t>MPC</a:t>
+                  <a:t>ECAL</a:t>
                 </a:r>
                 <a:r>
-                  <a:rPr lang="en-US" sz="800" dirty="0">
+                  <a:rPr lang="en-US" sz="900" dirty="0">
                     <a:latin typeface="Source Sans Pro" panose="020B0503030403020204" pitchFamily="34" charset="0"/>
                     <a:ea typeface="Source Sans Pro" panose="020B0503030403020204" pitchFamily="34" charset="0"/>
                   </a:rPr>
-                  <a:t> muon port card</a:t>
+                  <a:t> electromagnetic calorimeter</a:t>
                 </a:r>
               </a:p>
               <a:p>
                 <a:pPr algn="just"/>
                 <a:r>
-                  <a:rPr lang="en-US" sz="800" b="1" dirty="0" err="1">
+                  <a:rPr lang="en-US" sz="900" b="1" dirty="0">
                     <a:latin typeface="Source Sans Pro" panose="020B0503030403020204" pitchFamily="34" charset="0"/>
                     <a:ea typeface="Source Sans Pro" panose="020B0503030403020204" pitchFamily="34" charset="0"/>
                   </a:rPr>
-                  <a:t>oSLB</a:t>
+                  <a:t>HB</a:t>
                 </a:r>
                 <a:r>
-                  <a:rPr lang="en-US" sz="800" b="1" dirty="0">
+                  <a:rPr lang="en-US" sz="900" dirty="0">
                     <a:latin typeface="Source Sans Pro" panose="020B0503030403020204" pitchFamily="34" charset="0"/>
                     <a:ea typeface="Source Sans Pro" panose="020B0503030403020204" pitchFamily="34" charset="0"/>
                   </a:rPr>
-                  <a:t> </a:t>
+                  <a:t> HCAL in barrel</a:t>
+                </a:r>
+              </a:p>
+              <a:p>
+                <a:pPr algn="just"/>
+                <a:r>
+                  <a:rPr lang="en-US" sz="900" b="1" dirty="0">
+                    <a:latin typeface="Source Sans Pro" panose="020B0503030403020204" pitchFamily="34" charset="0"/>
+                    <a:ea typeface="Source Sans Pro" panose="020B0503030403020204" pitchFamily="34" charset="0"/>
+                  </a:rPr>
+                  <a:t>HCAL</a:t>
                 </a:r>
                 <a:r>
-                  <a:rPr lang="en-US" sz="800" dirty="0">
+                  <a:rPr lang="en-US" sz="900" dirty="0">
+                    <a:latin typeface="Source Sans Pro" panose="020B0503030403020204" pitchFamily="34" charset="0"/>
+                    <a:ea typeface="Source Sans Pro" panose="020B0503030403020204" pitchFamily="34" charset="0"/>
+                  </a:rPr>
+                  <a:t> hadronic calorimeter</a:t>
+                </a:r>
+              </a:p>
+              <a:p>
+                <a:pPr algn="just"/>
+                <a:r>
+                  <a:rPr lang="en-US" sz="900" b="1" dirty="0">
+                    <a:latin typeface="Source Sans Pro" panose="020B0503030403020204" pitchFamily="34" charset="0"/>
+                    <a:ea typeface="Source Sans Pro" panose="020B0503030403020204" pitchFamily="34" charset="0"/>
+                  </a:rPr>
+                  <a:t>HE</a:t>
+                </a:r>
+                <a:r>
+                  <a:rPr lang="en-US" sz="900" dirty="0">
+                    <a:latin typeface="Source Sans Pro" panose="020B0503030403020204" pitchFamily="34" charset="0"/>
+                    <a:ea typeface="Source Sans Pro" panose="020B0503030403020204" pitchFamily="34" charset="0"/>
+                  </a:rPr>
+                  <a:t> HCAL in end cap</a:t>
+                </a:r>
+              </a:p>
+              <a:p>
+                <a:pPr algn="just"/>
+                <a:r>
+                  <a:rPr lang="en-US" sz="900" b="1" dirty="0">
+                    <a:latin typeface="Source Sans Pro" panose="020B0503030403020204" pitchFamily="34" charset="0"/>
+                    <a:ea typeface="Source Sans Pro" panose="020B0503030403020204" pitchFamily="34" charset="0"/>
+                  </a:rPr>
+                  <a:t>HF</a:t>
+                </a:r>
+                <a:r>
+                  <a:rPr lang="en-US" sz="900" dirty="0">
+                    <a:latin typeface="Source Sans Pro" panose="020B0503030403020204" pitchFamily="34" charset="0"/>
+                    <a:ea typeface="Source Sans Pro" panose="020B0503030403020204" pitchFamily="34" charset="0"/>
+                  </a:rPr>
+                  <a:t> hadron forward calorimeter</a:t>
+                </a:r>
+              </a:p>
+              <a:p>
+                <a:pPr algn="just"/>
+                <a:r>
+                  <a:rPr lang="en-US" sz="900" b="1" dirty="0">
+                    <a:latin typeface="Source Sans Pro" panose="020B0503030403020204" pitchFamily="34" charset="0"/>
+                    <a:ea typeface="Source Sans Pro" panose="020B0503030403020204" pitchFamily="34" charset="0"/>
+                  </a:rPr>
+                  <a:t>oSLB </a:t>
+                </a:r>
+                <a:r>
+                  <a:rPr lang="en-US" sz="900" dirty="0">
                     <a:latin typeface="Source Sans Pro" panose="020B0503030403020204" pitchFamily="34" charset="0"/>
                     <a:ea typeface="Source Sans Pro" panose="020B0503030403020204" pitchFamily="34" charset="0"/>
                   </a:rPr>
@@ -16163,44 +15966,10 @@
               </a:p>
               <a:p>
                 <a:pPr algn="just"/>
-                <a:r>
-                  <a:rPr lang="en-US" sz="800" b="1" dirty="0">
-                    <a:latin typeface="Source Sans Pro" panose="020B0503030403020204" pitchFamily="34" charset="0"/>
-                    <a:ea typeface="Source Sans Pro" panose="020B0503030403020204" pitchFamily="34" charset="0"/>
-                  </a:rPr>
-                  <a:t>RPC</a:t>
-                </a:r>
-                <a:r>
-                  <a:rPr lang="en-US" sz="800" dirty="0">
-                    <a:latin typeface="Source Sans Pro" panose="020B0503030403020204" pitchFamily="34" charset="0"/>
-                    <a:ea typeface="Source Sans Pro" panose="020B0503030403020204" pitchFamily="34" charset="0"/>
-                  </a:rPr>
-                  <a:t> resistive plate chamber</a:t>
-                </a:r>
-              </a:p>
-              <a:p>
-                <a:pPr algn="just"/>
-                <a:r>
-                  <a:rPr lang="en-US" sz="800" b="1" dirty="0">
-                    <a:latin typeface="Source Sans Pro" panose="020B0503030403020204" pitchFamily="34" charset="0"/>
-                    <a:ea typeface="Source Sans Pro" panose="020B0503030403020204" pitchFamily="34" charset="0"/>
-                  </a:rPr>
-                  <a:t>SC</a:t>
-                </a:r>
-                <a:r>
-                  <a:rPr lang="en-US" sz="800" dirty="0">
-                    <a:latin typeface="Source Sans Pro" panose="020B0503030403020204" pitchFamily="34" charset="0"/>
-                    <a:ea typeface="Source Sans Pro" panose="020B0503030403020204" pitchFamily="34" charset="0"/>
-                  </a:rPr>
-                  <a:t> supercluster</a:t>
-                </a:r>
-              </a:p>
-              <a:p>
-                <a:pPr algn="just"/>
                 <a14:m>
                   <m:oMath xmlns:m="http://schemas.openxmlformats.org/officeDocument/2006/math">
                     <m:r>
-                      <a:rPr lang="en-US" sz="800" b="1" i="1">
+                      <a:rPr lang="en-US" sz="900" b="1" i="1">
                         <a:latin typeface="Cambria Math" panose="02040503050406030204" pitchFamily="18" charset="0"/>
                         <a:ea typeface="Cambria Math" panose="02040503050406030204" pitchFamily="18" charset="0"/>
                       </a:rPr>
@@ -16209,42 +15978,14 @@
                   </m:oMath>
                 </a14:m>
                 <a:r>
-                  <a:rPr lang="en-US" sz="800" b="1" dirty="0">
-                    <a:latin typeface="Source Sans Pro" panose="020B0503030403020204" pitchFamily="34" charset="0"/>
-                    <a:ea typeface="Source Sans Pro" panose="020B0503030403020204" pitchFamily="34" charset="0"/>
-                  </a:rPr>
-                  <a:t>GMT</a:t>
-                </a:r>
-                <a:r>
-                  <a:rPr lang="en-US" sz="800" dirty="0">
-                    <a:latin typeface="Source Sans Pro" panose="020B0503030403020204" pitchFamily="34" charset="0"/>
-                    <a:ea typeface="Source Sans Pro" panose="020B0503030403020204" pitchFamily="34" charset="0"/>
-                  </a:rPr>
-                  <a:t> Global Muon Trigger</a:t>
-                </a:r>
-              </a:p>
-              <a:p>
-                <a:pPr algn="just"/>
-                <a14:m>
-                  <m:oMath xmlns:m="http://schemas.openxmlformats.org/officeDocument/2006/math">
-                    <m:r>
-                      <a:rPr lang="en-US" sz="800" b="1" i="1">
-                        <a:latin typeface="Cambria Math" panose="02040503050406030204" pitchFamily="18" charset="0"/>
-                        <a:ea typeface="Cambria Math" panose="02040503050406030204" pitchFamily="18" charset="0"/>
-                      </a:rPr>
-                      <m:t>𝛍</m:t>
-                    </m:r>
-                  </m:oMath>
-                </a14:m>
-                <a:r>
-                  <a:rPr lang="en-US" sz="800" b="1" dirty="0">
+                  <a:rPr lang="en-US" sz="900" b="1" dirty="0">
                     <a:latin typeface="Source Sans Pro" panose="020B0503030403020204" pitchFamily="34" charset="0"/>
                     <a:ea typeface="Source Sans Pro" panose="020B0503030403020204" pitchFamily="34" charset="0"/>
                   </a:rPr>
                   <a:t>HTR</a:t>
                 </a:r>
                 <a:r>
-                  <a:rPr lang="en-US" sz="800" dirty="0">
+                  <a:rPr lang="en-US" sz="900" dirty="0">
                     <a:latin typeface="Source Sans Pro" panose="020B0503030403020204" pitchFamily="34" charset="0"/>
                     <a:ea typeface="Source Sans Pro" panose="020B0503030403020204" pitchFamily="34" charset="0"/>
                   </a:rPr>
@@ -16256,7 +15997,7 @@
                       <m:rPr>
                         <m:sty m:val="p"/>
                       </m:rPr>
-                      <a:rPr lang="en-US" sz="800">
+                      <a:rPr lang="en-US" sz="900">
                         <a:latin typeface="Cambria Math" panose="02040503050406030204" pitchFamily="18" charset="0"/>
                         <a:ea typeface="Cambria Math" panose="02040503050406030204" pitchFamily="18" charset="0"/>
                       </a:rPr>
@@ -16265,7 +16006,7 @@
                   </m:oMath>
                 </a14:m>
                 <a:r>
-                  <a:rPr lang="en-US" sz="800" dirty="0">
+                  <a:rPr lang="en-US" sz="900" dirty="0">
                     <a:latin typeface="Source Sans Pro" panose="020B0503030403020204" pitchFamily="34" charset="0"/>
                     <a:ea typeface="Source Sans Pro" panose="020B0503030403020204" pitchFamily="34" charset="0"/>
                   </a:rPr>
@@ -16278,10 +16019,10 @@
         <mc:Fallback xmlns="">
           <p:sp>
             <p:nvSpPr>
-              <p:cNvPr id="81" name="TextBox 80">
+              <p:cNvPr id="2" name="TextBox 1">
                 <a:extLst>
                   <a:ext uri="{FF2B5EF4-FFF2-40B4-BE49-F238E27FC236}">
-                    <a16:creationId xmlns:a16="http://schemas.microsoft.com/office/drawing/2014/main" id="{F568889C-9ADC-0242-9A10-DDC9ECA75765}"/>
+                    <a16:creationId xmlns:a16="http://schemas.microsoft.com/office/drawing/2014/main" id="{799B501A-CF66-1343-B29F-D23F4771E8B9}"/>
                   </a:ext>
                 </a:extLst>
               </p:cNvPr>
@@ -16292,8 +16033,8 @@
             </p:nvSpPr>
             <p:spPr>
               <a:xfrm>
-                <a:off x="1796641" y="5942668"/>
-                <a:ext cx="1691489" cy="954107"/>
+                <a:off x="-35373" y="5674417"/>
+                <a:ext cx="2049281" cy="1200329"/>
               </a:xfrm>
               <a:prstGeom prst="rect">
                 <a:avLst/>
@@ -16320,10 +16061,341 @@
           </p:sp>
         </mc:Fallback>
       </mc:AlternateContent>
+      <p:sp>
+        <p:nvSpPr>
+          <p:cNvPr id="79" name="TextBox 78">
+            <a:extLst>
+              <a:ext uri="{FF2B5EF4-FFF2-40B4-BE49-F238E27FC236}">
+                <a16:creationId xmlns:a16="http://schemas.microsoft.com/office/drawing/2014/main" id="{A804AFA0-A253-1449-9913-4EEC27824F6D}"/>
+              </a:ext>
+            </a:extLst>
+          </p:cNvPr>
+          <p:cNvSpPr txBox="1"/>
+          <p:nvPr/>
+        </p:nvSpPr>
+        <p:spPr>
+          <a:xfrm>
+            <a:off x="5809754" y="3186473"/>
+            <a:ext cx="1611563" cy="523220"/>
+          </a:xfrm>
+          <a:prstGeom prst="rect">
+            <a:avLst/>
+          </a:prstGeom>
+          <a:noFill/>
+        </p:spPr>
+        <p:txBody>
+          <a:bodyPr wrap="square" rtlCol="0">
+            <a:spAutoFit/>
+          </a:bodyPr>
+          <a:lstStyle/>
+          <a:p>
+            <a:pPr algn="ctr"/>
+            <a:r>
+              <a:rPr lang="en-US" sz="1400" dirty="0">
+                <a:latin typeface="Source Sans Pro" panose="020F0502020204030204" pitchFamily="34" charset="0"/>
+                <a:ea typeface="Source Sans Pro" panose="020F0502020204030204" pitchFamily="34" charset="0"/>
+              </a:rPr>
+              <a:t>Muon Track-Finder Layer</a:t>
+            </a:r>
+          </a:p>
+        </p:txBody>
+      </p:sp>
+      <p:cxnSp>
+        <p:nvCxnSpPr>
+          <p:cNvPr id="88" name="Straight Arrow Connector 87">
+            <a:extLst>
+              <a:ext uri="{FF2B5EF4-FFF2-40B4-BE49-F238E27FC236}">
+                <a16:creationId xmlns:a16="http://schemas.microsoft.com/office/drawing/2014/main" id="{5513BE76-AC81-0647-978C-078A81E9B743}"/>
+              </a:ext>
+            </a:extLst>
+          </p:cNvPr>
+          <p:cNvCxnSpPr>
+            <a:cxnSpLocks/>
+          </p:cNvCxnSpPr>
+          <p:nvPr/>
+        </p:nvCxnSpPr>
+        <p:spPr>
+          <a:xfrm>
+            <a:off x="4795098" y="5865990"/>
+            <a:ext cx="0" cy="347878"/>
+          </a:xfrm>
+          <a:prstGeom prst="straightConnector1">
+            <a:avLst/>
+          </a:prstGeom>
+          <a:ln w="12700">
+            <a:solidFill>
+              <a:schemeClr val="tx1"/>
+            </a:solidFill>
+            <a:tailEnd type="triangle"/>
+          </a:ln>
+        </p:spPr>
+        <p:style>
+          <a:lnRef idx="1">
+            <a:schemeClr val="accent1"/>
+          </a:lnRef>
+          <a:fillRef idx="0">
+            <a:schemeClr val="accent1"/>
+          </a:fillRef>
+          <a:effectRef idx="0">
+            <a:schemeClr val="accent1"/>
+          </a:effectRef>
+          <a:fontRef idx="minor">
+            <a:schemeClr val="tx1"/>
+          </a:fontRef>
+        </p:style>
+      </p:cxnSp>
+      <mc:AlternateContent xmlns:mc="http://schemas.openxmlformats.org/markup-compatibility/2006" xmlns:a14="http://schemas.microsoft.com/office/drawing/2010/main">
+        <mc:Choice Requires="a14">
+          <p:sp>
+            <p:nvSpPr>
+              <p:cNvPr id="80" name="TextBox 79">
+                <a:extLst>
+                  <a:ext uri="{FF2B5EF4-FFF2-40B4-BE49-F238E27FC236}">
+                    <a16:creationId xmlns:a16="http://schemas.microsoft.com/office/drawing/2014/main" id="{F02EDB2E-FBCB-CF4F-A396-75E745CA18F6}"/>
+                  </a:ext>
+                </a:extLst>
+              </p:cNvPr>
+              <p:cNvSpPr txBox="1"/>
+              <p:nvPr/>
+            </p:nvSpPr>
+            <p:spPr>
+              <a:xfrm>
+                <a:off x="7329049" y="5535675"/>
+                <a:ext cx="1947444" cy="1338828"/>
+              </a:xfrm>
+              <a:prstGeom prst="rect">
+                <a:avLst/>
+              </a:prstGeom>
+              <a:noFill/>
+            </p:spPr>
+            <p:txBody>
+              <a:bodyPr wrap="square" numCol="1" rtlCol="0">
+                <a:spAutoFit/>
+              </a:bodyPr>
+              <a:lstStyle/>
+              <a:p>
+                <a:pPr algn="just"/>
+                <a:r>
+                  <a:rPr lang="en-US" sz="900" dirty="0">
+                    <a:latin typeface="Source Sans Pro" panose="020B0503030403020204" pitchFamily="34" charset="0"/>
+                    <a:ea typeface="Source Sans Pro" panose="020B0503030403020204" pitchFamily="34" charset="0"/>
+                  </a:rPr>
+                  <a:t>Key (Muon Trigger):</a:t>
+                </a:r>
+              </a:p>
+              <a:p>
+                <a:pPr algn="just"/>
+                <a:r>
+                  <a:rPr lang="en-US" sz="900" b="1" dirty="0">
+                    <a:latin typeface="Source Sans Pro" panose="020B0503030403020204" pitchFamily="34" charset="0"/>
+                    <a:ea typeface="Source Sans Pro" panose="020B0503030403020204" pitchFamily="34" charset="0"/>
+                  </a:rPr>
+                  <a:t>CSC</a:t>
+                </a:r>
+                <a:r>
+                  <a:rPr lang="en-US" sz="900" dirty="0">
+                    <a:latin typeface="Source Sans Pro" panose="020B0503030403020204" pitchFamily="34" charset="0"/>
+                    <a:ea typeface="Source Sans Pro" panose="020B0503030403020204" pitchFamily="34" charset="0"/>
+                  </a:rPr>
+                  <a:t> cathode strip chamber</a:t>
+                </a:r>
+              </a:p>
+              <a:p>
+                <a:pPr algn="just"/>
+                <a:r>
+                  <a:rPr lang="en-US" sz="900" b="1" dirty="0" err="1">
+                    <a:latin typeface="Source Sans Pro" panose="020B0503030403020204" pitchFamily="34" charset="0"/>
+                    <a:ea typeface="Source Sans Pro" panose="020B0503030403020204" pitchFamily="34" charset="0"/>
+                  </a:rPr>
+                  <a:t>CuOF</a:t>
+                </a:r>
+                <a:r>
+                  <a:rPr lang="en-US" sz="900" dirty="0">
+                    <a:latin typeface="Source Sans Pro" panose="020B0503030403020204" pitchFamily="34" charset="0"/>
+                    <a:ea typeface="Source Sans Pro" panose="020B0503030403020204" pitchFamily="34" charset="0"/>
+                  </a:rPr>
+                  <a:t> copper to optical </a:t>
+                </a:r>
+                <a:r>
+                  <a:rPr lang="en-US" sz="900" dirty="0" err="1">
+                    <a:latin typeface="Source Sans Pro" panose="020B0503030403020204" pitchFamily="34" charset="0"/>
+                    <a:ea typeface="Source Sans Pro" panose="020B0503030403020204" pitchFamily="34" charset="0"/>
+                  </a:rPr>
+                  <a:t>fibre</a:t>
+                </a:r>
+                <a:r>
+                  <a:rPr lang="en-US" sz="900" dirty="0">
+                    <a:latin typeface="Source Sans Pro" panose="020B0503030403020204" pitchFamily="34" charset="0"/>
+                    <a:ea typeface="Source Sans Pro" panose="020B0503030403020204" pitchFamily="34" charset="0"/>
+                  </a:rPr>
+                  <a:t> board</a:t>
+                </a:r>
+              </a:p>
+              <a:p>
+                <a:pPr algn="just"/>
+                <a:r>
+                  <a:rPr lang="en-US" sz="900" b="1" dirty="0">
+                    <a:latin typeface="Source Sans Pro" panose="020B0503030403020204" pitchFamily="34" charset="0"/>
+                    <a:ea typeface="Source Sans Pro" panose="020B0503030403020204" pitchFamily="34" charset="0"/>
+                  </a:rPr>
+                  <a:t>DT</a:t>
+                </a:r>
+                <a:r>
+                  <a:rPr lang="en-US" sz="900" dirty="0">
+                    <a:latin typeface="Source Sans Pro" panose="020B0503030403020204" pitchFamily="34" charset="0"/>
+                    <a:ea typeface="Source Sans Pro" panose="020B0503030403020204" pitchFamily="34" charset="0"/>
+                  </a:rPr>
+                  <a:t> drift tube</a:t>
+                </a:r>
+              </a:p>
+              <a:p>
+                <a:pPr algn="just"/>
+                <a:r>
+                  <a:rPr lang="en-US" sz="900" b="1" dirty="0">
+                    <a:latin typeface="Source Sans Pro" panose="020B0503030403020204" pitchFamily="34" charset="0"/>
+                    <a:ea typeface="Source Sans Pro" panose="020B0503030403020204" pitchFamily="34" charset="0"/>
+                  </a:rPr>
+                  <a:t>LB </a:t>
+                </a:r>
+                <a:r>
+                  <a:rPr lang="en-US" sz="900" dirty="0">
+                    <a:latin typeface="Source Sans Pro" panose="020B0503030403020204" pitchFamily="34" charset="0"/>
+                    <a:ea typeface="Source Sans Pro" panose="020B0503030403020204" pitchFamily="34" charset="0"/>
+                  </a:rPr>
+                  <a:t>link board</a:t>
+                </a:r>
+              </a:p>
+              <a:p>
+                <a:pPr algn="just"/>
+                <a:r>
+                  <a:rPr lang="en-US" sz="900" b="1" dirty="0">
+                    <a:latin typeface="Source Sans Pro" panose="020B0503030403020204" pitchFamily="34" charset="0"/>
+                    <a:ea typeface="Source Sans Pro" panose="020B0503030403020204" pitchFamily="34" charset="0"/>
+                  </a:rPr>
+                  <a:t>MPC</a:t>
+                </a:r>
+                <a:r>
+                  <a:rPr lang="en-US" sz="900" dirty="0">
+                    <a:latin typeface="Source Sans Pro" panose="020B0503030403020204" pitchFamily="34" charset="0"/>
+                    <a:ea typeface="Source Sans Pro" panose="020B0503030403020204" pitchFamily="34" charset="0"/>
+                  </a:rPr>
+                  <a:t> muon port card</a:t>
+                </a:r>
+              </a:p>
+              <a:p>
+                <a:pPr algn="just"/>
+                <a:r>
+                  <a:rPr lang="en-US" sz="900" b="1" dirty="0">
+                    <a:latin typeface="Source Sans Pro" panose="020B0503030403020204" pitchFamily="34" charset="0"/>
+                    <a:ea typeface="Source Sans Pro" panose="020B0503030403020204" pitchFamily="34" charset="0"/>
+                  </a:rPr>
+                  <a:t>RPC</a:t>
+                </a:r>
+                <a:r>
+                  <a:rPr lang="en-US" sz="900" dirty="0">
+                    <a:latin typeface="Source Sans Pro" panose="020B0503030403020204" pitchFamily="34" charset="0"/>
+                    <a:ea typeface="Source Sans Pro" panose="020B0503030403020204" pitchFamily="34" charset="0"/>
+                  </a:rPr>
+                  <a:t> resistive plate chamber</a:t>
+                </a:r>
+              </a:p>
+              <a:p>
+                <a:pPr algn="just"/>
+                <a:r>
+                  <a:rPr lang="en-US" sz="900" b="1" dirty="0">
+                    <a:latin typeface="Source Sans Pro" panose="020B0503030403020204" pitchFamily="34" charset="0"/>
+                    <a:ea typeface="Source Sans Pro" panose="020B0503030403020204" pitchFamily="34" charset="0"/>
+                  </a:rPr>
+                  <a:t>SC</a:t>
+                </a:r>
+                <a:r>
+                  <a:rPr lang="en-US" sz="900" dirty="0">
+                    <a:latin typeface="Source Sans Pro" panose="020B0503030403020204" pitchFamily="34" charset="0"/>
+                    <a:ea typeface="Source Sans Pro" panose="020B0503030403020204" pitchFamily="34" charset="0"/>
+                  </a:rPr>
+                  <a:t> supercluster</a:t>
+                </a:r>
+              </a:p>
+              <a:p>
+                <a:pPr algn="just"/>
+                <a14:m>
+                  <m:oMath xmlns:m="http://schemas.openxmlformats.org/officeDocument/2006/math">
+                    <m:r>
+                      <a:rPr lang="en-US" sz="900" b="1" i="1">
+                        <a:latin typeface="Cambria Math" panose="02040503050406030204" pitchFamily="18" charset="0"/>
+                        <a:ea typeface="Cambria Math" panose="02040503050406030204" pitchFamily="18" charset="0"/>
+                      </a:rPr>
+                      <m:t>𝛍</m:t>
+                    </m:r>
+                  </m:oMath>
+                </a14:m>
+                <a:r>
+                  <a:rPr lang="en-US" sz="900" b="1" dirty="0">
+                    <a:latin typeface="Source Sans Pro" panose="020B0503030403020204" pitchFamily="34" charset="0"/>
+                    <a:ea typeface="Source Sans Pro" panose="020B0503030403020204" pitchFamily="34" charset="0"/>
+                  </a:rPr>
+                  <a:t>GMT</a:t>
+                </a:r>
+                <a:r>
+                  <a:rPr lang="en-US" sz="900" dirty="0">
+                    <a:latin typeface="Source Sans Pro" panose="020B0503030403020204" pitchFamily="34" charset="0"/>
+                    <a:ea typeface="Source Sans Pro" panose="020B0503030403020204" pitchFamily="34" charset="0"/>
+                  </a:rPr>
+                  <a:t> Global Muon Trigger</a:t>
+                </a:r>
+              </a:p>
+            </p:txBody>
+          </p:sp>
+        </mc:Choice>
+        <mc:Fallback xmlns="">
+          <p:sp>
+            <p:nvSpPr>
+              <p:cNvPr id="80" name="TextBox 79">
+                <a:extLst>
+                  <a:ext uri="{FF2B5EF4-FFF2-40B4-BE49-F238E27FC236}">
+                    <a16:creationId xmlns:a16="http://schemas.microsoft.com/office/drawing/2014/main" id="{F02EDB2E-FBCB-CF4F-A396-75E745CA18F6}"/>
+                  </a:ext>
+                </a:extLst>
+              </p:cNvPr>
+              <p:cNvSpPr txBox="1">
+                <a:spLocks noRot="1" noChangeAspect="1" noMove="1" noResize="1" noEditPoints="1" noAdjustHandles="1" noChangeArrowheads="1" noChangeShapeType="1" noTextEdit="1"/>
+              </p:cNvSpPr>
+              <p:nvPr/>
+            </p:nvSpPr>
+            <p:spPr>
+              <a:xfrm>
+                <a:off x="7329049" y="5535675"/>
+                <a:ext cx="1947444" cy="1338828"/>
+              </a:xfrm>
+              <a:prstGeom prst="rect">
+                <a:avLst/>
+              </a:prstGeom>
+              <a:blipFill>
+                <a:blip r:embed="rId7"/>
+                <a:stretch>
+                  <a:fillRect b="-943"/>
+                </a:stretch>
+              </a:blipFill>
+            </p:spPr>
+            <p:txBody>
+              <a:bodyPr/>
+              <a:lstStyle/>
+              <a:p>
+                <a:r>
+                  <a:rPr lang="en-US">
+                    <a:noFill/>
+                  </a:rPr>
+                  <a:t> </a:t>
+                </a:r>
+              </a:p>
+            </p:txBody>
+          </p:sp>
+        </mc:Fallback>
+      </mc:AlternateContent>
     </p:spTree>
     <p:extLst>
       <p:ext uri="{BB962C8B-B14F-4D97-AF65-F5344CB8AC3E}">
-        <p14:creationId xmlns:p14="http://schemas.microsoft.com/office/powerpoint/2010/main" val="1052137687"/>
+        <p14:creationId xmlns:p14="http://schemas.microsoft.com/office/powerpoint/2010/main" val="1713243388"/>
       </p:ext>
     </p:extLst>
   </p:cSld>

</xml_diff>